<commit_message>
fixed comments for presentation
</commit_message>
<xml_diff>
--- a/ausarbeitung/Wolken (1).pptx
+++ b/ausarbeitung/Wolken (1).pptx
@@ -226,7 +226,7 @@
           <a:p>
             <a:fld id="{AD4751DB-9D75-47AA-9872-327E592D1EA1}" type="datetimeFigureOut">
               <a:rPr lang="de-DE" smtClean="0"/>
-              <a:t>11.07.2018</a:t>
+              <a:t>12.07.2018</a:t>
             </a:fld>
             <a:endParaRPr lang="de-DE"/>
           </a:p>
@@ -538,6 +538,57 @@
           <a:lstStyle/>
           <a:p>
             <a:r>
+              <a:rPr lang="de-DE" sz="1200" b="0" i="0" kern="1200" dirty="0">
+                <a:solidFill>
+                  <a:schemeClr val="tx1"/>
+                </a:solidFill>
+                <a:effectLst/>
+                <a:latin typeface="+mn-lt"/>
+                <a:ea typeface="+mn-ea"/>
+                <a:cs typeface="+mn-cs"/>
+              </a:rPr>
+              <a:t>Weltorganisation für Meteorologie, Wolken-online </a:t>
+            </a:r>
+            <a:r>
+              <a:rPr lang="de-DE" sz="1200" b="0" i="0" kern="1200" dirty="0">
+                <a:solidFill>
+                  <a:schemeClr val="tx1"/>
+                </a:solidFill>
+                <a:effectLst/>
+                <a:latin typeface="+mn-lt"/>
+                <a:ea typeface="+mn-ea"/>
+                <a:cs typeface="+mn-cs"/>
+                <a:sym typeface="Wingdings" panose="05000000000000000000" pitchFamily="2" charset="2"/>
+              </a:rPr>
+              <a:t> 800 Bilder</a:t>
+            </a:r>
+            <a:endParaRPr lang="de-DE" sz="1200" b="0" i="0" kern="1200" dirty="0">
+              <a:solidFill>
+                <a:schemeClr val="tx1"/>
+              </a:solidFill>
+              <a:effectLst/>
+              <a:latin typeface="+mn-lt"/>
+              <a:ea typeface="+mn-ea"/>
+              <a:cs typeface="+mn-cs"/>
+            </a:endParaRPr>
+          </a:p>
+          <a:p>
+            <a:br>
+              <a:rPr lang="de-DE" sz="1200" b="0" i="0" u="none" strike="noStrike" kern="1200" dirty="0">
+                <a:solidFill>
+                  <a:schemeClr val="tx1"/>
+                </a:solidFill>
+                <a:effectLst/>
+                <a:latin typeface="+mn-lt"/>
+                <a:ea typeface="+mn-ea"/>
+                <a:cs typeface="+mn-cs"/>
+                <a:hlinkClick r:id="rId3"/>
+              </a:rPr>
+            </a:br>
+            <a:endParaRPr lang="de-DE" dirty="0"/>
+          </a:p>
+          <a:p>
+            <a:r>
               <a:rPr lang="de-DE" dirty="0"/>
               <a:t>Dafür eigene </a:t>
             </a:r>
@@ -666,7 +717,7 @@
           <a:p>
             <a:fld id="{FFA30538-EFC0-4593-81AF-509E83D5B3F4}" type="slidenum">
               <a:rPr lang="de-DE" smtClean="0"/>
-              <a:t>12</a:t>
+              <a:t>11</a:t>
             </a:fld>
             <a:endParaRPr lang="de-DE"/>
           </a:p>
@@ -675,7 +726,7 @@
     </p:spTree>
     <p:extLst>
       <p:ext uri="{BB962C8B-B14F-4D97-AF65-F5344CB8AC3E}">
-        <p14:creationId xmlns:p14="http://schemas.microsoft.com/office/powerpoint/2010/main" val="529956990"/>
+        <p14:creationId xmlns:p14="http://schemas.microsoft.com/office/powerpoint/2010/main" val="142956413"/>
       </p:ext>
     </p:extLst>
   </p:cSld>
@@ -731,45 +782,13 @@
           <a:p>
             <a:r>
               <a:rPr lang="de-DE" dirty="0"/>
-              <a:t>Haben vor allem am unteren Rand der Bilder oft noch Boden zu sehen </a:t>
+              <a:t>Gutes Ergebnis </a:t>
             </a:r>
             <a:r>
               <a:rPr lang="de-DE" dirty="0">
                 <a:sym typeface="Wingdings" panose="05000000000000000000" pitchFamily="2" charset="2"/>
               </a:rPr>
-              <a:t> wegbekommen da sonst </a:t>
-            </a:r>
-            <a:r>
-              <a:rPr lang="de-DE" dirty="0" err="1">
-                <a:sym typeface="Wingdings" panose="05000000000000000000" pitchFamily="2" charset="2"/>
-              </a:rPr>
-              <a:t>verfälschung</a:t>
-            </a:r>
-            <a:r>
-              <a:rPr lang="de-DE" dirty="0">
-                <a:sym typeface="Wingdings" panose="05000000000000000000" pitchFamily="2" charset="2"/>
-              </a:rPr>
-              <a:t> der Merkmale</a:t>
-            </a:r>
-          </a:p>
-          <a:p>
-            <a:r>
-              <a:rPr lang="de-DE" dirty="0">
-                <a:sym typeface="Wingdings" panose="05000000000000000000" pitchFamily="2" charset="2"/>
-              </a:rPr>
-              <a:t>Eigene Funktion geschrieben: Zunächst komplett standardmäßig </a:t>
-            </a:r>
-            <a:r>
-              <a:rPr lang="de-DE" dirty="0" err="1">
-                <a:sym typeface="Wingdings" panose="05000000000000000000" pitchFamily="2" charset="2"/>
-              </a:rPr>
-              <a:t>binarisieren</a:t>
-            </a:r>
-            <a:r>
-              <a:rPr lang="de-DE" dirty="0">
-                <a:sym typeface="Wingdings" panose="05000000000000000000" pitchFamily="2" charset="2"/>
-              </a:rPr>
-              <a:t>, danach von unten heran eine kleine Box bauen  prüft den Schwarzanteil (nicht Wolke) zum Weißanteil (Wolke), sobald dieser einen bestimmen Wert erreicht  untere Grenze gefunden und Bild wieder auf Standardformat bringen.</a:t>
+              <a:t></a:t>
             </a:r>
             <a:endParaRPr lang="de-DE" dirty="0"/>
           </a:p>
@@ -792,7 +811,7 @@
           <a:p>
             <a:fld id="{FFA30538-EFC0-4593-81AF-509E83D5B3F4}" type="slidenum">
               <a:rPr lang="de-DE" smtClean="0"/>
-              <a:t>13</a:t>
+              <a:t>12</a:t>
             </a:fld>
             <a:endParaRPr lang="de-DE"/>
           </a:p>
@@ -801,7 +820,7 @@
     </p:spTree>
     <p:extLst>
       <p:ext uri="{BB962C8B-B14F-4D97-AF65-F5344CB8AC3E}">
-        <p14:creationId xmlns:p14="http://schemas.microsoft.com/office/powerpoint/2010/main" val="500637885"/>
+        <p14:creationId xmlns:p14="http://schemas.microsoft.com/office/powerpoint/2010/main" val="529956990"/>
       </p:ext>
     </p:extLst>
   </p:cSld>
@@ -855,6 +874,16 @@
           <a:bodyPr/>
           <a:lstStyle/>
           <a:p>
+            <a:r>
+              <a:rPr lang="de-DE" dirty="0"/>
+              <a:t>Berg heller als der Himmel </a:t>
+            </a:r>
+            <a:r>
+              <a:rPr lang="de-DE" dirty="0">
+                <a:sym typeface="Wingdings" panose="05000000000000000000" pitchFamily="2" charset="2"/>
+              </a:rPr>
+              <a:t> Berg ist noch drinnen</a:t>
+            </a:r>
             <a:endParaRPr lang="de-DE" dirty="0"/>
           </a:p>
         </p:txBody>
@@ -876,7 +905,7 @@
           <a:p>
             <a:fld id="{FFA30538-EFC0-4593-81AF-509E83D5B3F4}" type="slidenum">
               <a:rPr lang="de-DE" smtClean="0"/>
-              <a:t>14</a:t>
+              <a:t>13</a:t>
             </a:fld>
             <a:endParaRPr lang="de-DE"/>
           </a:p>
@@ -885,7 +914,7 @@
     </p:spTree>
     <p:extLst>
       <p:ext uri="{BB962C8B-B14F-4D97-AF65-F5344CB8AC3E}">
-        <p14:creationId xmlns:p14="http://schemas.microsoft.com/office/powerpoint/2010/main" val="2989138397"/>
+        <p14:creationId xmlns:p14="http://schemas.microsoft.com/office/powerpoint/2010/main" val="500637885"/>
       </p:ext>
     </p:extLst>
   </p:cSld>
@@ -941,45 +970,7 @@
           <a:p>
             <a:r>
               <a:rPr lang="de-DE" dirty="0"/>
-              <a:t>Ca. 41 % Richtige.</a:t>
-            </a:r>
-          </a:p>
-          <a:p>
-            <a:r>
-              <a:rPr lang="de-DE" dirty="0"/>
-              <a:t>Die Kanten werden mit Sobel gefunden. Vorher wird der </a:t>
-            </a:r>
-            <a:r>
-              <a:rPr lang="de-DE" dirty="0" err="1"/>
-              <a:t>Gaussfilter</a:t>
-            </a:r>
-            <a:r>
-              <a:rPr lang="de-DE" dirty="0"/>
-              <a:t> (Weichzeichnen) angewendet, damit die Kanten dicker werden.</a:t>
-            </a:r>
-          </a:p>
-          <a:p>
-            <a:r>
-              <a:rPr lang="de-DE" dirty="0"/>
-              <a:t>Auswertung des Kantenbildes: Weißwerte pro Zeile addieren, sodass ein Art Histogramm entsteht.</a:t>
-            </a:r>
-            <a:br>
-              <a:rPr lang="de-DE" dirty="0"/>
-            </a:br>
-            <a:endParaRPr lang="de-DE" dirty="0"/>
-          </a:p>
-          <a:p>
-            <a:r>
-              <a:rPr lang="de-DE" dirty="0"/>
-              <a:t>Bei Nachfrage: </a:t>
-            </a:r>
-            <a:r>
-              <a:rPr lang="de-DE" dirty="0" err="1"/>
-              <a:t>Stratocumuliform</a:t>
-            </a:r>
-            <a:r>
-              <a:rPr lang="de-DE" dirty="0"/>
-              <a:t> ;)</a:t>
+              <a:t>Hier hat es die Wolken komplett weggeschnitten</a:t>
             </a:r>
           </a:p>
         </p:txBody>
@@ -1001,7 +992,7 @@
           <a:p>
             <a:fld id="{FFA30538-EFC0-4593-81AF-509E83D5B3F4}" type="slidenum">
               <a:rPr lang="de-DE" smtClean="0"/>
-              <a:t>15</a:t>
+              <a:t>14</a:t>
             </a:fld>
             <a:endParaRPr lang="de-DE"/>
           </a:p>
@@ -1010,7 +1001,7 @@
     </p:spTree>
     <p:extLst>
       <p:ext uri="{BB962C8B-B14F-4D97-AF65-F5344CB8AC3E}">
-        <p14:creationId xmlns:p14="http://schemas.microsoft.com/office/powerpoint/2010/main" val="1193158337"/>
+        <p14:creationId xmlns:p14="http://schemas.microsoft.com/office/powerpoint/2010/main" val="2989138397"/>
       </p:ext>
     </p:extLst>
   </p:cSld>
@@ -1066,15 +1057,45 @@
           <a:p>
             <a:r>
               <a:rPr lang="de-DE" dirty="0"/>
-              <a:t>Ca. 39 % Richtige, besonders </a:t>
+              <a:t>Ca. 41 % Richtige.</a:t>
+            </a:r>
+          </a:p>
+          <a:p>
+            <a:r>
+              <a:rPr lang="de-DE" dirty="0"/>
+              <a:t>Die Kanten werden mit Sobel gefunden. Vorher wird der </a:t>
             </a:r>
             <a:r>
               <a:rPr lang="de-DE" dirty="0" err="1"/>
-              <a:t>cirriform</a:t>
-            </a:r>
-            <a:r>
-              <a:rPr lang="de-DE" dirty="0"/>
-              <a:t> wird schlecht erkannt. </a:t>
+              <a:t>Gaussfilter</a:t>
+            </a:r>
+            <a:r>
+              <a:rPr lang="de-DE" dirty="0"/>
+              <a:t> (Weichzeichnen) angewendet, damit die Kanten dicker werden.</a:t>
+            </a:r>
+          </a:p>
+          <a:p>
+            <a:r>
+              <a:rPr lang="de-DE" dirty="0"/>
+              <a:t>Auswertung des Kantenbildes: Weißwerte pro Zeile addieren, sodass ein Art Histogramm entsteht.</a:t>
+            </a:r>
+            <a:br>
+              <a:rPr lang="de-DE" dirty="0"/>
+            </a:br>
+            <a:endParaRPr lang="de-DE" dirty="0"/>
+          </a:p>
+          <a:p>
+            <a:r>
+              <a:rPr lang="de-DE" dirty="0"/>
+              <a:t>Bei Nachfrage: </a:t>
+            </a:r>
+            <a:r>
+              <a:rPr lang="de-DE" dirty="0" err="1"/>
+              <a:t>Stratocumuliform</a:t>
+            </a:r>
+            <a:r>
+              <a:rPr lang="de-DE" dirty="0"/>
+              <a:t> ;)</a:t>
             </a:r>
           </a:p>
         </p:txBody>
@@ -1096,7 +1117,7 @@
           <a:p>
             <a:fld id="{FFA30538-EFC0-4593-81AF-509E83D5B3F4}" type="slidenum">
               <a:rPr lang="de-DE" smtClean="0"/>
-              <a:t>16</a:t>
+              <a:t>15</a:t>
             </a:fld>
             <a:endParaRPr lang="de-DE"/>
           </a:p>
@@ -1105,7 +1126,7 @@
     </p:spTree>
     <p:extLst>
       <p:ext uri="{BB962C8B-B14F-4D97-AF65-F5344CB8AC3E}">
-        <p14:creationId xmlns:p14="http://schemas.microsoft.com/office/powerpoint/2010/main" val="290716493"/>
+        <p14:creationId xmlns:p14="http://schemas.microsoft.com/office/powerpoint/2010/main" val="1193158337"/>
       </p:ext>
     </p:extLst>
   </p:cSld>
@@ -1161,119 +1182,16 @@
           <a:p>
             <a:r>
               <a:rPr lang="de-DE" dirty="0"/>
-              <a:t>Gewichte der Merkmale sind unterschiedlich, je nachdem welche Wolkenarten man zuvor schon ausgeschlossen hat. </a:t>
-            </a:r>
-            <a:r>
-              <a:rPr lang="de-DE" dirty="0">
-                <a:sym typeface="Wingdings" panose="05000000000000000000" pitchFamily="2" charset="2"/>
-              </a:rPr>
-              <a:t> Entscheidungsbaum?</a:t>
-            </a:r>
-          </a:p>
-          <a:p>
-            <a:r>
-              <a:rPr lang="de-DE" dirty="0">
-                <a:sym typeface="Wingdings" panose="05000000000000000000" pitchFamily="2" charset="2"/>
-              </a:rPr>
-              <a:t>K-</a:t>
-            </a:r>
-            <a:r>
-              <a:rPr lang="de-DE" dirty="0" err="1">
-                <a:sym typeface="Wingdings" panose="05000000000000000000" pitchFamily="2" charset="2"/>
-              </a:rPr>
-              <a:t>nearast</a:t>
-            </a:r>
-            <a:r>
-              <a:rPr lang="de-DE" dirty="0">
-                <a:sym typeface="Wingdings" panose="05000000000000000000" pitchFamily="2" charset="2"/>
-              </a:rPr>
-              <a:t> </a:t>
-            </a:r>
-            <a:r>
-              <a:rPr lang="de-DE" dirty="0" err="1">
-                <a:sym typeface="Wingdings" panose="05000000000000000000" pitchFamily="2" charset="2"/>
-              </a:rPr>
-              <a:t>Neighbours</a:t>
-            </a:r>
-            <a:r>
-              <a:rPr lang="de-DE" dirty="0">
-                <a:sym typeface="Wingdings" panose="05000000000000000000" pitchFamily="2" charset="2"/>
-              </a:rPr>
-              <a:t> – nicht nur den nächsten </a:t>
-            </a:r>
-            <a:r>
-              <a:rPr lang="de-DE" dirty="0" err="1">
-                <a:sym typeface="Wingdings" panose="05000000000000000000" pitchFamily="2" charset="2"/>
-              </a:rPr>
-              <a:t>nachbar</a:t>
-            </a:r>
-            <a:r>
-              <a:rPr lang="de-DE" dirty="0">
-                <a:sym typeface="Wingdings" panose="05000000000000000000" pitchFamily="2" charset="2"/>
-              </a:rPr>
-              <a:t> sondern </a:t>
-            </a:r>
-            <a:r>
-              <a:rPr lang="de-DE" dirty="0" err="1">
-                <a:sym typeface="Wingdings" panose="05000000000000000000" pitchFamily="2" charset="2"/>
-              </a:rPr>
-              <a:t>vllt</a:t>
-            </a:r>
-            <a:r>
-              <a:rPr lang="de-DE" dirty="0">
-                <a:sym typeface="Wingdings" panose="05000000000000000000" pitchFamily="2" charset="2"/>
-              </a:rPr>
-              <a:t> 3 oder 5?</a:t>
-            </a:r>
-          </a:p>
-          <a:p>
-            <a:r>
-              <a:rPr lang="de-DE" dirty="0">
-                <a:sym typeface="Wingdings" panose="05000000000000000000" pitchFamily="2" charset="2"/>
-              </a:rPr>
-              <a:t>Hybrid Lösung?</a:t>
-            </a:r>
-          </a:p>
-          <a:p>
-            <a:r>
-              <a:rPr lang="de-DE" dirty="0">
-                <a:sym typeface="Wingdings" panose="05000000000000000000" pitchFamily="2" charset="2"/>
-              </a:rPr>
-              <a:t>Frequenz als Merkmal – wie frequentiert sind die </a:t>
-            </a:r>
-            <a:r>
-              <a:rPr lang="de-DE" dirty="0" err="1">
-                <a:sym typeface="Wingdings" panose="05000000000000000000" pitchFamily="2" charset="2"/>
-              </a:rPr>
-              <a:t>wolken</a:t>
-            </a:r>
-            <a:r>
-              <a:rPr lang="de-DE" dirty="0">
-                <a:sym typeface="Wingdings" panose="05000000000000000000" pitchFamily="2" charset="2"/>
-              </a:rPr>
-              <a:t> am Himmel?</a:t>
-            </a:r>
-          </a:p>
-          <a:p>
-            <a:r>
-              <a:rPr lang="de-DE" dirty="0">
-                <a:sym typeface="Wingdings" panose="05000000000000000000" pitchFamily="2" charset="2"/>
-              </a:rPr>
-              <a:t>Data Augmentation – für mehr Bilder (Spiegelung an der Y-Achse, stauchen, drehen?(</a:t>
-            </a:r>
-            <a:r>
-              <a:rPr lang="de-DE" dirty="0" err="1">
-                <a:sym typeface="Wingdings" panose="05000000000000000000" pitchFamily="2" charset="2"/>
-              </a:rPr>
-              <a:t>boden</a:t>
-            </a:r>
-            <a:r>
-              <a:rPr lang="de-DE" dirty="0">
-                <a:sym typeface="Wingdings" panose="05000000000000000000" pitchFamily="2" charset="2"/>
-              </a:rPr>
-              <a:t> :c)</a:t>
-            </a:r>
-            <a:endParaRPr lang="de-DE" dirty="0"/>
+              <a:t>Ca. 39 % Richtige, besonders </a:t>
+            </a:r>
+            <a:r>
+              <a:rPr lang="de-DE" dirty="0" err="1"/>
+              <a:t>cirriform</a:t>
+            </a:r>
+            <a:r>
+              <a:rPr lang="de-DE" dirty="0"/>
+              <a:t> wird schlecht erkannt  (da so unterschiedliches aussehen)</a:t>
+            </a:r>
           </a:p>
         </p:txBody>
       </p:sp>
@@ -1294,7 +1212,7 @@
           <a:p>
             <a:fld id="{FFA30538-EFC0-4593-81AF-509E83D5B3F4}" type="slidenum">
               <a:rPr lang="de-DE" smtClean="0"/>
-              <a:t>17</a:t>
+              <a:t>16</a:t>
             </a:fld>
             <a:endParaRPr lang="de-DE"/>
           </a:p>
@@ -1303,7 +1221,7 @@
     </p:spTree>
     <p:extLst>
       <p:ext uri="{BB962C8B-B14F-4D97-AF65-F5344CB8AC3E}">
-        <p14:creationId xmlns:p14="http://schemas.microsoft.com/office/powerpoint/2010/main" val="642194744"/>
+        <p14:creationId xmlns:p14="http://schemas.microsoft.com/office/powerpoint/2010/main" val="290716493"/>
       </p:ext>
     </p:extLst>
   </p:cSld>
@@ -1359,23 +1277,117 @@
           <a:p>
             <a:r>
               <a:rPr lang="de-DE" dirty="0"/>
-              <a:t>Großes Problem bleibt einfach: die Wolkenarten sehen trotz unserer nur 4 Gruppen </a:t>
-            </a:r>
-            <a:r>
-              <a:rPr lang="de-DE" dirty="0" err="1"/>
-              <a:t>immernoch</a:t>
-            </a:r>
-            <a:r>
-              <a:rPr lang="de-DE" dirty="0"/>
-              <a:t> sehr </a:t>
-            </a:r>
-            <a:r>
-              <a:rPr lang="de-DE" dirty="0" err="1"/>
-              <a:t>sehr</a:t>
-            </a:r>
-            <a:r>
-              <a:rPr lang="de-DE"/>
-              <a:t> gleich aus.</a:t>
+              <a:t>Gewichte der Merkmale sind unterschiedlich, je nachdem welche Wolkenarten man zuvor schon ausgeschlossen hat. </a:t>
+            </a:r>
+            <a:r>
+              <a:rPr lang="de-DE" dirty="0">
+                <a:sym typeface="Wingdings" panose="05000000000000000000" pitchFamily="2" charset="2"/>
+              </a:rPr>
+              <a:t> Entscheidungsbaum?</a:t>
+            </a:r>
+          </a:p>
+          <a:p>
+            <a:r>
+              <a:rPr lang="de-DE" dirty="0">
+                <a:sym typeface="Wingdings" panose="05000000000000000000" pitchFamily="2" charset="2"/>
+              </a:rPr>
+              <a:t>K-</a:t>
+            </a:r>
+            <a:r>
+              <a:rPr lang="de-DE" dirty="0" err="1">
+                <a:sym typeface="Wingdings" panose="05000000000000000000" pitchFamily="2" charset="2"/>
+              </a:rPr>
+              <a:t>nearast</a:t>
+            </a:r>
+            <a:r>
+              <a:rPr lang="de-DE" dirty="0">
+                <a:sym typeface="Wingdings" panose="05000000000000000000" pitchFamily="2" charset="2"/>
+              </a:rPr>
+              <a:t> </a:t>
+            </a:r>
+            <a:r>
+              <a:rPr lang="de-DE" dirty="0" err="1">
+                <a:sym typeface="Wingdings" panose="05000000000000000000" pitchFamily="2" charset="2"/>
+              </a:rPr>
+              <a:t>Neighbours</a:t>
+            </a:r>
+            <a:r>
+              <a:rPr lang="de-DE" dirty="0">
+                <a:sym typeface="Wingdings" panose="05000000000000000000" pitchFamily="2" charset="2"/>
+              </a:rPr>
+              <a:t> – nicht nur den nächsten </a:t>
+            </a:r>
+            <a:r>
+              <a:rPr lang="de-DE" dirty="0" err="1">
+                <a:sym typeface="Wingdings" panose="05000000000000000000" pitchFamily="2" charset="2"/>
+              </a:rPr>
+              <a:t>nachbar</a:t>
+            </a:r>
+            <a:r>
+              <a:rPr lang="de-DE" dirty="0">
+                <a:sym typeface="Wingdings" panose="05000000000000000000" pitchFamily="2" charset="2"/>
+              </a:rPr>
+              <a:t> sondern </a:t>
+            </a:r>
+            <a:r>
+              <a:rPr lang="de-DE" dirty="0" err="1">
+                <a:sym typeface="Wingdings" panose="05000000000000000000" pitchFamily="2" charset="2"/>
+              </a:rPr>
+              <a:t>vllt</a:t>
+            </a:r>
+            <a:r>
+              <a:rPr lang="de-DE" dirty="0">
+                <a:sym typeface="Wingdings" panose="05000000000000000000" pitchFamily="2" charset="2"/>
+              </a:rPr>
+              <a:t> 3 oder 5?</a:t>
+            </a:r>
+          </a:p>
+          <a:p>
+            <a:r>
+              <a:rPr lang="de-DE" dirty="0">
+                <a:sym typeface="Wingdings" panose="05000000000000000000" pitchFamily="2" charset="2"/>
+              </a:rPr>
+              <a:t>Hybrid Lösung?</a:t>
+            </a:r>
+          </a:p>
+          <a:p>
+            <a:r>
+              <a:rPr lang="de-DE" dirty="0">
+                <a:sym typeface="Wingdings" panose="05000000000000000000" pitchFamily="2" charset="2"/>
+              </a:rPr>
+              <a:t>Frequenz als Merkmal – wie frequentiert sind die </a:t>
+            </a:r>
+            <a:r>
+              <a:rPr lang="de-DE" dirty="0" err="1">
+                <a:sym typeface="Wingdings" panose="05000000000000000000" pitchFamily="2" charset="2"/>
+              </a:rPr>
+              <a:t>wolken</a:t>
+            </a:r>
+            <a:r>
+              <a:rPr lang="de-DE" dirty="0">
+                <a:sym typeface="Wingdings" panose="05000000000000000000" pitchFamily="2" charset="2"/>
+              </a:rPr>
+              <a:t> am Himmel?</a:t>
+            </a:r>
+          </a:p>
+          <a:p>
+            <a:r>
+              <a:rPr lang="de-DE" dirty="0">
+                <a:sym typeface="Wingdings" panose="05000000000000000000" pitchFamily="2" charset="2"/>
+              </a:rPr>
+              <a:t>Data Augmentation – für mehr Bilder (Spiegelung an der Y-Achse, stauchen, drehen?(</a:t>
+            </a:r>
+            <a:r>
+              <a:rPr lang="de-DE" dirty="0" err="1">
+                <a:sym typeface="Wingdings" panose="05000000000000000000" pitchFamily="2" charset="2"/>
+              </a:rPr>
+              <a:t>boden</a:t>
+            </a:r>
+            <a:r>
+              <a:rPr lang="de-DE" dirty="0">
+                <a:sym typeface="Wingdings" panose="05000000000000000000" pitchFamily="2" charset="2"/>
+              </a:rPr>
+              <a:t> :c)</a:t>
             </a:r>
             <a:endParaRPr lang="de-DE" dirty="0"/>
           </a:p>
@@ -1398,7 +1410,7 @@
           <a:p>
             <a:fld id="{FFA30538-EFC0-4593-81AF-509E83D5B3F4}" type="slidenum">
               <a:rPr lang="de-DE" smtClean="0"/>
-              <a:t>18</a:t>
+              <a:t>17</a:t>
             </a:fld>
             <a:endParaRPr lang="de-DE"/>
           </a:p>
@@ -1407,7 +1419,7 @@
     </p:spTree>
     <p:extLst>
       <p:ext uri="{BB962C8B-B14F-4D97-AF65-F5344CB8AC3E}">
-        <p14:creationId xmlns:p14="http://schemas.microsoft.com/office/powerpoint/2010/main" val="1682009794"/>
+        <p14:creationId xmlns:p14="http://schemas.microsoft.com/office/powerpoint/2010/main" val="642194744"/>
       </p:ext>
     </p:extLst>
   </p:cSld>
@@ -1463,6 +1475,114 @@
           <a:p>
             <a:r>
               <a:rPr lang="de-DE" dirty="0"/>
+              <a:t>Großes Problem bleibt einfach: die Wolkenarten sehen trotz unserer nur 4 Gruppen </a:t>
+            </a:r>
+            <a:r>
+              <a:rPr lang="de-DE" dirty="0" err="1"/>
+              <a:t>immernoch</a:t>
+            </a:r>
+            <a:r>
+              <a:rPr lang="de-DE" dirty="0"/>
+              <a:t> sehr </a:t>
+            </a:r>
+            <a:r>
+              <a:rPr lang="de-DE" dirty="0" err="1"/>
+              <a:t>sehr</a:t>
+            </a:r>
+            <a:r>
+              <a:rPr lang="de-DE" dirty="0"/>
+              <a:t> gleich aus. Hängt damit zusammen, dass wolkenarten auch danach klassifiziert werden , in welcher höhe </a:t>
+            </a:r>
+            <a:r>
+              <a:rPr lang="de-DE"/>
+              <a:t>sie sind</a:t>
+            </a:r>
+            <a:endParaRPr lang="de-DE" dirty="0"/>
+          </a:p>
+        </p:txBody>
+      </p:sp>
+      <p:sp>
+        <p:nvSpPr>
+          <p:cNvPr id="4" name="Foliennummernplatzhalter 3"/>
+          <p:cNvSpPr>
+            <a:spLocks noGrp="1"/>
+          </p:cNvSpPr>
+          <p:nvPr>
+            <p:ph type="sldNum" sz="quarter" idx="10"/>
+          </p:nvPr>
+        </p:nvSpPr>
+        <p:spPr/>
+        <p:txBody>
+          <a:bodyPr/>
+          <a:lstStyle/>
+          <a:p>
+            <a:fld id="{FFA30538-EFC0-4593-81AF-509E83D5B3F4}" type="slidenum">
+              <a:rPr lang="de-DE" smtClean="0"/>
+              <a:t>18</a:t>
+            </a:fld>
+            <a:endParaRPr lang="de-DE"/>
+          </a:p>
+        </p:txBody>
+      </p:sp>
+    </p:spTree>
+    <p:extLst>
+      <p:ext uri="{BB962C8B-B14F-4D97-AF65-F5344CB8AC3E}">
+        <p14:creationId xmlns:p14="http://schemas.microsoft.com/office/powerpoint/2010/main" val="1682009794"/>
+      </p:ext>
+    </p:extLst>
+  </p:cSld>
+  <p:clrMapOvr>
+    <a:masterClrMapping/>
+  </p:clrMapOvr>
+</p:notes>
+</file>
+
+<file path=ppt/notesSlides/notesSlide18.xml><?xml version="1.0" encoding="utf-8"?>
+<p:notes xmlns:a="http://schemas.openxmlformats.org/drawingml/2006/main" xmlns:r="http://schemas.openxmlformats.org/officeDocument/2006/relationships" xmlns:p="http://schemas.openxmlformats.org/presentationml/2006/main">
+  <p:cSld>
+    <p:spTree>
+      <p:nvGrpSpPr>
+        <p:cNvPr id="1" name=""/>
+        <p:cNvGrpSpPr/>
+        <p:nvPr/>
+      </p:nvGrpSpPr>
+      <p:grpSpPr>
+        <a:xfrm>
+          <a:off x="0" y="0"/>
+          <a:ext cx="0" cy="0"/>
+          <a:chOff x="0" y="0"/>
+          <a:chExt cx="0" cy="0"/>
+        </a:xfrm>
+      </p:grpSpPr>
+      <p:sp>
+        <p:nvSpPr>
+          <p:cNvPr id="2" name="Folienbildplatzhalter 1"/>
+          <p:cNvSpPr>
+            <a:spLocks noGrp="1" noRot="1" noChangeAspect="1"/>
+          </p:cNvSpPr>
+          <p:nvPr>
+            <p:ph type="sldImg"/>
+          </p:nvPr>
+        </p:nvSpPr>
+        <p:spPr/>
+      </p:sp>
+      <p:sp>
+        <p:nvSpPr>
+          <p:cNvPr id="3" name="Notizenplatzhalter 2"/>
+          <p:cNvSpPr>
+            <a:spLocks noGrp="1"/>
+          </p:cNvSpPr>
+          <p:nvPr>
+            <p:ph type="body" idx="1"/>
+          </p:nvPr>
+        </p:nvSpPr>
+        <p:spPr/>
+        <p:txBody>
+          <a:bodyPr/>
+          <a:lstStyle/>
+          <a:p>
+            <a:r>
+              <a:rPr lang="de-DE" dirty="0"/>
               <a:t>Trainiert auf den Bildern von </a:t>
             </a:r>
             <a:r>
@@ -1509,7 +1629,7 @@
 </p:notes>
 </file>
 
-<file path=ppt/notesSlides/notesSlide18.xml><?xml version="1.0" encoding="utf-8"?>
+<file path=ppt/notesSlides/notesSlide19.xml><?xml version="1.0" encoding="utf-8"?>
 <p:notes xmlns:a="http://schemas.openxmlformats.org/drawingml/2006/main" xmlns:r="http://schemas.openxmlformats.org/officeDocument/2006/relationships" xmlns:p="http://schemas.openxmlformats.org/presentationml/2006/main">
   <p:cSld>
     <p:spTree>
@@ -1705,25 +1825,13 @@
           <a:p>
             <a:r>
               <a:rPr lang="de-DE" dirty="0"/>
-              <a:t>Schichtwolke; tritt entweder als faseriger Schleier, in dem dünne Streifenbildung vorhanden sein kann, oder als schleierartiger Nebel auf; kann die Sonne nie komplett verdecken</a:t>
-            </a:r>
-          </a:p>
-          <a:p>
-            <a:r>
-              <a:rPr lang="de-DE" dirty="0"/>
-              <a:t>graue, mittelhohe Schichtwolke ohne Konturen</a:t>
-            </a:r>
-          </a:p>
-          <a:p>
-            <a:r>
-              <a:rPr lang="de-DE" dirty="0"/>
-              <a:t>Stark ausgedehnte, dunkelgraue Schicht; starke vertikale Ausdehnung.</a:t>
-            </a:r>
-          </a:p>
-          <a:p>
-            <a:r>
-              <a:rPr lang="de-DE" dirty="0"/>
-              <a:t>niedere Schichtwolken, werden auch als Hochnebel oder Höhennebel bezeichnet; völlig strukturlos</a:t>
+              <a:t>Schichtwolke als schleierartiger Nebel auf; kann die Sonne nie komplett verdecken</a:t>
+            </a:r>
+          </a:p>
+          <a:p>
+            <a:r>
+              <a:rPr lang="de-DE" dirty="0"/>
+              <a:t>Grau, völlig strukturlos</a:t>
             </a:r>
           </a:p>
         </p:txBody>
@@ -1810,7 +1918,7 @@
           <a:p>
             <a:r>
               <a:rPr lang="de-DE" dirty="0"/>
-              <a:t>dünne Fasern oder Fäden, selten auch Büschel. Ränder meist durch die starken Höhenwinde ausgefranst.</a:t>
+              <a:t>dünne Fasern oder Fäden, selten auch Büschel; Ränder sind ausgefranst.</a:t>
             </a:r>
           </a:p>
         </p:txBody>
@@ -1897,19 +2005,19 @@
           <a:p>
             <a:r>
               <a:rPr lang="de-DE" dirty="0"/>
-              <a:t>Haufenwolken; tritt meistens in mehr oder weniger ausgedehnten Feldern auf, die aus kleinen körnigen Wolkenteilen bestehen; selten auch kleine zerfetzte Büschel.</a:t>
-            </a:r>
-          </a:p>
-          <a:p>
-            <a:r>
-              <a:rPr lang="de-DE" dirty="0"/>
-              <a:t>Haufenwolke; tritt meistens als großes Feld auf, das aus vielen kleinen einzelnen Wolken besteht.</a:t>
-            </a:r>
-          </a:p>
-          <a:p>
-            <a:r>
-              <a:rPr lang="de-DE" dirty="0"/>
-              <a:t>Haufenschichtwolken ohne Fasern; tritt in Flecken, Feldern oder Schichten auf, die sich aus gleichmäßig angeordneten Schollen, Ballen oder Walzen zusammenstellen.</a:t>
+              <a:t>Haufenwolken ausgedehnten Feldern auf selten, auch kleine zerfetzte Büschel.</a:t>
+            </a:r>
+          </a:p>
+          <a:p>
+            <a:r>
+              <a:rPr lang="de-DE" dirty="0"/>
+              <a:t>tritt meistens als großes Feld auf, das aus vielen kleinen einzelnen Wolken besteht.</a:t>
+            </a:r>
+          </a:p>
+          <a:p>
+            <a:r>
+              <a:rPr lang="de-DE" dirty="0"/>
+              <a:t>Schollen, Ballen oder Walzen zusammenstellen.</a:t>
             </a:r>
           </a:p>
         </p:txBody>
@@ -1996,7 +2104,7 @@
           <a:p>
             <a:r>
               <a:rPr lang="de-DE" dirty="0"/>
-              <a:t>Cumulus sind dichte scharf voneinander abgegrenzten Haufenwolken, die Ränder sehen manchmal zerfetzt aus und verändern sich ständig</a:t>
+              <a:t>Cumulus sind dichte scharf voneinander abgegrenzten Haufenwolken, die Ränder sehen manchmal zerfetzt aus</a:t>
             </a:r>
           </a:p>
           <a:p>
@@ -2097,25 +2205,7 @@
           <a:p>
             <a:r>
               <a:rPr lang="de-DE" dirty="0"/>
-              <a:t>Schichtwolke; tritt entweder als faseriger Schleier, in dem dünne Streifenbildung vorhanden sein kann, oder als schleierartiger Nebel auf; kann die Sonne nie komplett verdecken</a:t>
-            </a:r>
-          </a:p>
-          <a:p>
-            <a:r>
-              <a:rPr lang="de-DE" dirty="0"/>
-              <a:t>graue, mittelhohe Schichtwolke ohne Konturen</a:t>
-            </a:r>
-          </a:p>
-          <a:p>
-            <a:r>
-              <a:rPr lang="de-DE" dirty="0"/>
-              <a:t>Stark ausgedehnte, dunkelgraue Schicht; starke vertikale Ausdehnung.</a:t>
-            </a:r>
-          </a:p>
-          <a:p>
-            <a:r>
-              <a:rPr lang="de-DE" dirty="0"/>
-              <a:t>niedere Schichtwolken, werden auch als Hochnebel oder Höhennebel bezeichnet; völlig strukturlos</a:t>
+              <a:t>Wolken, welche von stärkeren Natureinflüssen getroffen wurden</a:t>
             </a:r>
           </a:p>
         </p:txBody>
@@ -2202,173 +2292,36 @@
           <a:p>
             <a:r>
               <a:rPr lang="de-DE" dirty="0"/>
-              <a:t>Zunächst Bildung des arithmetischen Mittels, dies ist unser </a:t>
+              <a:t>Verschiedene Quellen</a:t>
+            </a:r>
+          </a:p>
+          <a:p>
+            <a:r>
+              <a:rPr lang="de-DE" dirty="0"/>
+              <a:t>Viele Wolkenarten (10) zu 4</a:t>
+            </a:r>
+          </a:p>
+          <a:p>
+            <a:r>
+              <a:rPr lang="de-DE" dirty="0"/>
+              <a:t>Auf eine </a:t>
             </a:r>
             <a:r>
               <a:rPr lang="de-DE" dirty="0" err="1"/>
-              <a:t>Treshold</a:t>
-            </a:r>
-            <a:r>
-              <a:rPr lang="de-DE" dirty="0"/>
-              <a:t> für das </a:t>
-            </a:r>
-            <a:r>
-              <a:rPr lang="de-DE" dirty="0" err="1"/>
-              <a:t>binarisieren</a:t>
-            </a:r>
-            <a:endParaRPr lang="de-DE" dirty="0"/>
-          </a:p>
-          <a:p>
-            <a:pPr marL="171450" indent="-171450">
-              <a:buFont typeface="Wingdings" panose="05000000000000000000" pitchFamily="2" charset="2"/>
-              <a:buChar char="è"/>
-            </a:pPr>
-            <a:r>
-              <a:rPr lang="de-DE" dirty="0">
-                <a:sym typeface="Wingdings" panose="05000000000000000000" pitchFamily="2" charset="2"/>
-              </a:rPr>
-              <a:t>Durch </a:t>
-            </a:r>
-            <a:r>
-              <a:rPr lang="de-DE" dirty="0" err="1">
-                <a:sym typeface="Wingdings" panose="05000000000000000000" pitchFamily="2" charset="2"/>
-              </a:rPr>
-              <a:t>umwandlung</a:t>
-            </a:r>
-            <a:r>
-              <a:rPr lang="de-DE" dirty="0">
-                <a:sym typeface="Wingdings" panose="05000000000000000000" pitchFamily="2" charset="2"/>
-              </a:rPr>
-              <a:t> in den HSV Raum gewisse Farbräume gleich aussortiert, die niemals im Himmel vorkommen können</a:t>
-            </a:r>
-          </a:p>
-          <a:p>
-            <a:pPr marL="171450" indent="-171450">
-              <a:buFont typeface="Wingdings" panose="05000000000000000000" pitchFamily="2" charset="2"/>
-              <a:buChar char="è"/>
-            </a:pPr>
-            <a:r>
-              <a:rPr lang="de-DE" dirty="0">
-                <a:sym typeface="Wingdings" panose="05000000000000000000" pitchFamily="2" charset="2"/>
-              </a:rPr>
-              <a:t>Region </a:t>
-            </a:r>
-            <a:r>
-              <a:rPr lang="de-DE" dirty="0" err="1">
-                <a:sym typeface="Wingdings" panose="05000000000000000000" pitchFamily="2" charset="2"/>
-              </a:rPr>
-              <a:t>growing</a:t>
-            </a:r>
-            <a:r>
-              <a:rPr lang="de-DE" dirty="0">
-                <a:sym typeface="Wingdings" panose="05000000000000000000" pitchFamily="2" charset="2"/>
-              </a:rPr>
-              <a:t> ging </a:t>
-            </a:r>
-            <a:r>
-              <a:rPr lang="de-DE" dirty="0" err="1">
-                <a:sym typeface="Wingdings" panose="05000000000000000000" pitchFamily="2" charset="2"/>
-              </a:rPr>
-              <a:t>nich</a:t>
-            </a:r>
-            <a:endParaRPr lang="de-DE" dirty="0"/>
-          </a:p>
-          <a:p>
-            <a:endParaRPr lang="de-DE" dirty="0"/>
-          </a:p>
-          <a:p>
-            <a:r>
-              <a:rPr lang="de-DE" dirty="0"/>
-              <a:t>Haben vor allem am unteren Rand der Bilder oft noch Boden zu sehen </a:t>
-            </a:r>
-          </a:p>
-          <a:p>
-            <a:r>
-              <a:rPr lang="de-DE" dirty="0">
-                <a:sym typeface="Wingdings" panose="05000000000000000000" pitchFamily="2" charset="2"/>
-              </a:rPr>
-              <a:t> wegbekommen da sonst </a:t>
-            </a:r>
-            <a:r>
-              <a:rPr lang="de-DE" dirty="0" err="1">
-                <a:sym typeface="Wingdings" panose="05000000000000000000" pitchFamily="2" charset="2"/>
-              </a:rPr>
-              <a:t>verfälschung</a:t>
-            </a:r>
-            <a:r>
-              <a:rPr lang="de-DE" dirty="0">
-                <a:sym typeface="Wingdings" panose="05000000000000000000" pitchFamily="2" charset="2"/>
-              </a:rPr>
-              <a:t> der Merkmale</a:t>
-            </a:r>
-          </a:p>
-          <a:p>
-            <a:r>
-              <a:rPr lang="de-DE" dirty="0">
-                <a:sym typeface="Wingdings" panose="05000000000000000000" pitchFamily="2" charset="2"/>
-              </a:rPr>
-              <a:t>Eigene Funktion geschrieben: Zunächst komplett standardmäßig </a:t>
-            </a:r>
-            <a:r>
-              <a:rPr lang="de-DE" dirty="0" err="1">
-                <a:sym typeface="Wingdings" panose="05000000000000000000" pitchFamily="2" charset="2"/>
-              </a:rPr>
-              <a:t>binarisieren</a:t>
-            </a:r>
-            <a:r>
-              <a:rPr lang="de-DE" dirty="0">
-                <a:sym typeface="Wingdings" panose="05000000000000000000" pitchFamily="2" charset="2"/>
-              </a:rPr>
-              <a:t>, danach von unten heran eine kleine Box bauen weil wir den </a:t>
-            </a:r>
-            <a:r>
-              <a:rPr lang="de-DE" dirty="0" err="1">
-                <a:sym typeface="Wingdings" panose="05000000000000000000" pitchFamily="2" charset="2"/>
-              </a:rPr>
-              <a:t>himmel</a:t>
-            </a:r>
-            <a:r>
-              <a:rPr lang="de-DE" dirty="0">
-                <a:sym typeface="Wingdings" panose="05000000000000000000" pitchFamily="2" charset="2"/>
-              </a:rPr>
-              <a:t> meistens auch haben wollen</a:t>
-            </a:r>
-          </a:p>
-          <a:p>
-            <a:pPr marL="171450" indent="-171450">
-              <a:buFont typeface="Wingdings" panose="05000000000000000000" pitchFamily="2" charset="2"/>
-              <a:buChar char="è"/>
-            </a:pPr>
-            <a:r>
-              <a:rPr lang="de-DE" dirty="0">
-                <a:sym typeface="Wingdings" panose="05000000000000000000" pitchFamily="2" charset="2"/>
-              </a:rPr>
-              <a:t>prüft den Schwarzanteil (nicht Himmel) zum Weißanteil (Himmel) des </a:t>
-            </a:r>
-            <a:r>
-              <a:rPr lang="de-DE" dirty="0" err="1">
-                <a:sym typeface="Wingdings" panose="05000000000000000000" pitchFamily="2" charset="2"/>
-              </a:rPr>
-              <a:t>binarisierten</a:t>
-            </a:r>
-            <a:r>
-              <a:rPr lang="de-DE" dirty="0">
-                <a:sym typeface="Wingdings" panose="05000000000000000000" pitchFamily="2" charset="2"/>
-              </a:rPr>
-              <a:t> Bildes, sobald dieser einen bestimmen Wert erreicht</a:t>
-            </a:r>
-          </a:p>
-          <a:p>
-            <a:pPr marL="171450" indent="-171450">
-              <a:buFont typeface="Wingdings" panose="05000000000000000000" pitchFamily="2" charset="2"/>
-              <a:buChar char="è"/>
-            </a:pPr>
-            <a:r>
-              <a:rPr lang="de-DE" dirty="0">
-                <a:sym typeface="Wingdings" panose="05000000000000000000" pitchFamily="2" charset="2"/>
-              </a:rPr>
-              <a:t> untere Grenze gefunden und Bild wieder auf Standardformat bringen.</a:t>
-            </a:r>
+              <a:t>größe</a:t>
+            </a:r>
+            <a:r>
+              <a:rPr lang="de-DE" dirty="0"/>
+              <a:t> bringen,</a:t>
+            </a:r>
+          </a:p>
+          <a:p>
+            <a:r>
+              <a:rPr lang="de-DE" dirty="0"/>
+              <a:t>Geschnitten</a:t>
+            </a:r>
+          </a:p>
+          <a:p>
             <a:endParaRPr lang="de-DE" dirty="0"/>
           </a:p>
         </p:txBody>
@@ -2390,7 +2343,7 @@
           <a:p>
             <a:fld id="{FFA30538-EFC0-4593-81AF-509E83D5B3F4}" type="slidenum">
               <a:rPr lang="de-DE" smtClean="0"/>
-              <a:t>9</a:t>
+              <a:t>8</a:t>
             </a:fld>
             <a:endParaRPr lang="de-DE"/>
           </a:p>
@@ -2399,7 +2352,7 @@
     </p:spTree>
     <p:extLst>
       <p:ext uri="{BB962C8B-B14F-4D97-AF65-F5344CB8AC3E}">
-        <p14:creationId xmlns:p14="http://schemas.microsoft.com/office/powerpoint/2010/main" val="2042746959"/>
+        <p14:creationId xmlns:p14="http://schemas.microsoft.com/office/powerpoint/2010/main" val="4002079439"/>
       </p:ext>
     </p:extLst>
   </p:cSld>
@@ -2455,13 +2408,153 @@
           <a:p>
             <a:r>
               <a:rPr lang="de-DE" dirty="0"/>
-              <a:t>Gutes Ergebnis </a:t>
-            </a:r>
+              <a:t>Ziel: Auf vielen Bildern ist Boden zu sehen: diesen wegschneiden, da </a:t>
+            </a:r>
+            <a:r>
+              <a:rPr lang="de-DE" dirty="0" err="1"/>
+              <a:t>verfälschung</a:t>
+            </a:r>
+            <a:r>
+              <a:rPr lang="de-DE" dirty="0"/>
+              <a:t> der Merkmale</a:t>
+            </a:r>
+          </a:p>
+          <a:p>
+            <a:r>
+              <a:rPr lang="de-DE" dirty="0"/>
+              <a:t>Zunächst Bildung des arithmetischen Mittels, dies ist unser </a:t>
+            </a:r>
+            <a:r>
+              <a:rPr lang="de-DE" dirty="0" err="1"/>
+              <a:t>Treshold</a:t>
+            </a:r>
+            <a:r>
+              <a:rPr lang="de-DE" dirty="0"/>
+              <a:t> für das </a:t>
+            </a:r>
+            <a:r>
+              <a:rPr lang="de-DE" dirty="0" err="1"/>
+              <a:t>binarisieren</a:t>
+            </a:r>
+            <a:r>
+              <a:rPr lang="de-DE" dirty="0"/>
+              <a:t> mithilfe von boxen</a:t>
+            </a:r>
+          </a:p>
+          <a:p>
+            <a:pPr marL="171450" indent="-171450">
+              <a:buFont typeface="Wingdings" panose="05000000000000000000" pitchFamily="2" charset="2"/>
+              <a:buChar char="è"/>
+            </a:pPr>
             <a:r>
               <a:rPr lang="de-DE" dirty="0">
                 <a:sym typeface="Wingdings" panose="05000000000000000000" pitchFamily="2" charset="2"/>
               </a:rPr>
-              <a:t></a:t>
+              <a:t>Durch </a:t>
+            </a:r>
+            <a:r>
+              <a:rPr lang="de-DE" dirty="0" err="1">
+                <a:sym typeface="Wingdings" panose="05000000000000000000" pitchFamily="2" charset="2"/>
+              </a:rPr>
+              <a:t>umwandlung</a:t>
+            </a:r>
+            <a:r>
+              <a:rPr lang="de-DE" dirty="0">
+                <a:sym typeface="Wingdings" panose="05000000000000000000" pitchFamily="2" charset="2"/>
+              </a:rPr>
+              <a:t> in den HSV Raum gewisse Farbräume gleich aussortiert, die niemals im Himmel vorkommen können</a:t>
+            </a:r>
+          </a:p>
+          <a:p>
+            <a:pPr marL="171450" indent="-171450">
+              <a:buFont typeface="Wingdings" panose="05000000000000000000" pitchFamily="2" charset="2"/>
+              <a:buChar char="è"/>
+            </a:pPr>
+            <a:r>
+              <a:rPr lang="de-DE" dirty="0">
+                <a:sym typeface="Wingdings" panose="05000000000000000000" pitchFamily="2" charset="2"/>
+              </a:rPr>
+              <a:t>Region </a:t>
+            </a:r>
+            <a:r>
+              <a:rPr lang="de-DE" dirty="0" err="1">
+                <a:sym typeface="Wingdings" panose="05000000000000000000" pitchFamily="2" charset="2"/>
+              </a:rPr>
+              <a:t>growing</a:t>
+            </a:r>
+            <a:r>
+              <a:rPr lang="de-DE" dirty="0">
+                <a:sym typeface="Wingdings" panose="05000000000000000000" pitchFamily="2" charset="2"/>
+              </a:rPr>
+              <a:t> ging </a:t>
+            </a:r>
+            <a:r>
+              <a:rPr lang="de-DE" dirty="0" err="1">
+                <a:sym typeface="Wingdings" panose="05000000000000000000" pitchFamily="2" charset="2"/>
+              </a:rPr>
+              <a:t>nich</a:t>
+            </a:r>
+            <a:endParaRPr lang="de-DE" dirty="0"/>
+          </a:p>
+          <a:p>
+            <a:endParaRPr lang="de-DE" dirty="0">
+              <a:sym typeface="Wingdings" panose="05000000000000000000" pitchFamily="2" charset="2"/>
+            </a:endParaRPr>
+          </a:p>
+          <a:p>
+            <a:r>
+              <a:rPr lang="de-DE" dirty="0">
+                <a:sym typeface="Wingdings" panose="05000000000000000000" pitchFamily="2" charset="2"/>
+              </a:rPr>
+              <a:t>Eigene Funktion geschrieben: Zunächst komplett standardmäßig </a:t>
+            </a:r>
+            <a:r>
+              <a:rPr lang="de-DE" dirty="0" err="1">
+                <a:sym typeface="Wingdings" panose="05000000000000000000" pitchFamily="2" charset="2"/>
+              </a:rPr>
+              <a:t>binarisieren</a:t>
+            </a:r>
+            <a:r>
+              <a:rPr lang="de-DE" dirty="0">
+                <a:sym typeface="Wingdings" panose="05000000000000000000" pitchFamily="2" charset="2"/>
+              </a:rPr>
+              <a:t>, danach von unten heran eine kleine Box da nur Himmel wichtig</a:t>
+            </a:r>
+          </a:p>
+          <a:p>
+            <a:pPr marL="171450" indent="-171450">
+              <a:buFont typeface="Wingdings" panose="05000000000000000000" pitchFamily="2" charset="2"/>
+              <a:buChar char="è"/>
+            </a:pPr>
+            <a:r>
+              <a:rPr lang="de-DE" dirty="0">
+                <a:sym typeface="Wingdings" panose="05000000000000000000" pitchFamily="2" charset="2"/>
+              </a:rPr>
+              <a:t>prüft den Schwarzanteil (nicht Himmel) zum Weißanteil (Himmel) des </a:t>
+            </a:r>
+            <a:r>
+              <a:rPr lang="de-DE" dirty="0" err="1">
+                <a:sym typeface="Wingdings" panose="05000000000000000000" pitchFamily="2" charset="2"/>
+              </a:rPr>
+              <a:t>binarisierten</a:t>
+            </a:r>
+            <a:r>
+              <a:rPr lang="de-DE" dirty="0">
+                <a:sym typeface="Wingdings" panose="05000000000000000000" pitchFamily="2" charset="2"/>
+              </a:rPr>
+              <a:t> Bildes, sobald dieser den bestimmen Wert erreicht</a:t>
+            </a:r>
+          </a:p>
+          <a:p>
+            <a:pPr marL="171450" indent="-171450">
+              <a:buFont typeface="Wingdings" panose="05000000000000000000" pitchFamily="2" charset="2"/>
+              <a:buChar char="è"/>
+            </a:pPr>
+            <a:r>
+              <a:rPr lang="de-DE" dirty="0">
+                <a:sym typeface="Wingdings" panose="05000000000000000000" pitchFamily="2" charset="2"/>
+              </a:rPr>
+              <a:t> untere Grenze gefunden und Bild wieder auf Standardformat bringen.</a:t>
             </a:r>
             <a:endParaRPr lang="de-DE" dirty="0"/>
           </a:p>
@@ -2484,7 +2577,7 @@
           <a:p>
             <a:fld id="{FFA30538-EFC0-4593-81AF-509E83D5B3F4}" type="slidenum">
               <a:rPr lang="de-DE" smtClean="0"/>
-              <a:t>10</a:t>
+              <a:t>9</a:t>
             </a:fld>
             <a:endParaRPr lang="de-DE"/>
           </a:p>
@@ -2493,7 +2586,7 @@
     </p:spTree>
     <p:extLst>
       <p:ext uri="{BB962C8B-B14F-4D97-AF65-F5344CB8AC3E}">
-        <p14:creationId xmlns:p14="http://schemas.microsoft.com/office/powerpoint/2010/main" val="2601506680"/>
+        <p14:creationId xmlns:p14="http://schemas.microsoft.com/office/powerpoint/2010/main" val="2042746959"/>
       </p:ext>
     </p:extLst>
   </p:cSld>
@@ -2578,7 +2671,7 @@
           <a:p>
             <a:fld id="{FFA30538-EFC0-4593-81AF-509E83D5B3F4}" type="slidenum">
               <a:rPr lang="de-DE" smtClean="0"/>
-              <a:t>11</a:t>
+              <a:t>10</a:t>
             </a:fld>
             <a:endParaRPr lang="de-DE"/>
           </a:p>
@@ -2587,7 +2680,7 @@
     </p:spTree>
     <p:extLst>
       <p:ext uri="{BB962C8B-B14F-4D97-AF65-F5344CB8AC3E}">
-        <p14:creationId xmlns:p14="http://schemas.microsoft.com/office/powerpoint/2010/main" val="142956413"/>
+        <p14:creationId xmlns:p14="http://schemas.microsoft.com/office/powerpoint/2010/main" val="2601506680"/>
       </p:ext>
     </p:extLst>
   </p:cSld>
@@ -2788,7 +2881,7 @@
           <a:p>
             <a:fld id="{A96754D5-AF5E-411A-9792-199172EBB005}" type="datetimeFigureOut">
               <a:rPr lang="de-DE" smtClean="0"/>
-              <a:t>11.07.2018</a:t>
+              <a:t>12.07.2018</a:t>
             </a:fld>
             <a:endParaRPr lang="de-DE"/>
           </a:p>
@@ -3224,7 +3317,7 @@
           <a:p>
             <a:fld id="{A96754D5-AF5E-411A-9792-199172EBB005}" type="datetimeFigureOut">
               <a:rPr lang="de-DE" smtClean="0"/>
-              <a:t>11.07.2018</a:t>
+              <a:t>12.07.2018</a:t>
             </a:fld>
             <a:endParaRPr lang="de-DE"/>
           </a:p>
@@ -3474,7 +3567,7 @@
           <a:p>
             <a:fld id="{A96754D5-AF5E-411A-9792-199172EBB005}" type="datetimeFigureOut">
               <a:rPr lang="de-DE" smtClean="0"/>
-              <a:t>11.07.2018</a:t>
+              <a:t>12.07.2018</a:t>
             </a:fld>
             <a:endParaRPr lang="de-DE"/>
           </a:p>
@@ -3782,7 +3875,7 @@
           <a:p>
             <a:fld id="{A96754D5-AF5E-411A-9792-199172EBB005}" type="datetimeFigureOut">
               <a:rPr lang="de-DE" smtClean="0"/>
-              <a:t>11.07.2018</a:t>
+              <a:t>12.07.2018</a:t>
             </a:fld>
             <a:endParaRPr lang="de-DE"/>
           </a:p>
@@ -4100,7 +4193,7 @@
           <a:p>
             <a:fld id="{A96754D5-AF5E-411A-9792-199172EBB005}" type="datetimeFigureOut">
               <a:rPr lang="de-DE" smtClean="0"/>
-              <a:t>11.07.2018</a:t>
+              <a:t>12.07.2018</a:t>
             </a:fld>
             <a:endParaRPr lang="de-DE"/>
           </a:p>
@@ -4402,7 +4495,7 @@
           <a:p>
             <a:fld id="{A96754D5-AF5E-411A-9792-199172EBB005}" type="datetimeFigureOut">
               <a:rPr lang="de-DE" smtClean="0"/>
-              <a:t>11.07.2018</a:t>
+              <a:t>12.07.2018</a:t>
             </a:fld>
             <a:endParaRPr lang="de-DE"/>
           </a:p>
@@ -4769,7 +4862,7 @@
           <a:p>
             <a:fld id="{A96754D5-AF5E-411A-9792-199172EBB005}" type="datetimeFigureOut">
               <a:rPr lang="de-DE" smtClean="0"/>
-              <a:t>11.07.2018</a:t>
+              <a:t>12.07.2018</a:t>
             </a:fld>
             <a:endParaRPr lang="de-DE"/>
           </a:p>
@@ -4943,7 +5036,7 @@
           <a:p>
             <a:fld id="{A96754D5-AF5E-411A-9792-199172EBB005}" type="datetimeFigureOut">
               <a:rPr lang="de-DE" smtClean="0"/>
-              <a:t>11.07.2018</a:t>
+              <a:t>12.07.2018</a:t>
             </a:fld>
             <a:endParaRPr lang="de-DE"/>
           </a:p>
@@ -5123,7 +5216,7 @@
           <a:p>
             <a:fld id="{A96754D5-AF5E-411A-9792-199172EBB005}" type="datetimeFigureOut">
               <a:rPr lang="de-DE" smtClean="0"/>
-              <a:t>11.07.2018</a:t>
+              <a:t>12.07.2018</a:t>
             </a:fld>
             <a:endParaRPr lang="de-DE"/>
           </a:p>
@@ -5293,7 +5386,7 @@
           <a:p>
             <a:fld id="{A96754D5-AF5E-411A-9792-199172EBB005}" type="datetimeFigureOut">
               <a:rPr lang="de-DE" smtClean="0"/>
-              <a:t>11.07.2018</a:t>
+              <a:t>12.07.2018</a:t>
             </a:fld>
             <a:endParaRPr lang="de-DE"/>
           </a:p>
@@ -5543,7 +5636,7 @@
           <a:p>
             <a:fld id="{A96754D5-AF5E-411A-9792-199172EBB005}" type="datetimeFigureOut">
               <a:rPr lang="de-DE" smtClean="0"/>
-              <a:t>11.07.2018</a:t>
+              <a:t>12.07.2018</a:t>
             </a:fld>
             <a:endParaRPr lang="de-DE"/>
           </a:p>
@@ -5779,7 +5872,7 @@
           <a:p>
             <a:fld id="{A96754D5-AF5E-411A-9792-199172EBB005}" type="datetimeFigureOut">
               <a:rPr lang="de-DE" smtClean="0"/>
-              <a:t>11.07.2018</a:t>
+              <a:t>12.07.2018</a:t>
             </a:fld>
             <a:endParaRPr lang="de-DE"/>
           </a:p>
@@ -6161,7 +6254,7 @@
           <a:p>
             <a:fld id="{A96754D5-AF5E-411A-9792-199172EBB005}" type="datetimeFigureOut">
               <a:rPr lang="de-DE" smtClean="0"/>
-              <a:t>11.07.2018</a:t>
+              <a:t>12.07.2018</a:t>
             </a:fld>
             <a:endParaRPr lang="de-DE"/>
           </a:p>
@@ -6279,7 +6372,7 @@
           <a:p>
             <a:fld id="{A96754D5-AF5E-411A-9792-199172EBB005}" type="datetimeFigureOut">
               <a:rPr lang="de-DE" smtClean="0"/>
-              <a:t>11.07.2018</a:t>
+              <a:t>12.07.2018</a:t>
             </a:fld>
             <a:endParaRPr lang="de-DE"/>
           </a:p>
@@ -6374,7 +6467,7 @@
           <a:p>
             <a:fld id="{A96754D5-AF5E-411A-9792-199172EBB005}" type="datetimeFigureOut">
               <a:rPr lang="de-DE" smtClean="0"/>
-              <a:t>11.07.2018</a:t>
+              <a:t>12.07.2018</a:t>
             </a:fld>
             <a:endParaRPr lang="de-DE"/>
           </a:p>
@@ -6629,7 +6722,7 @@
           <a:p>
             <a:fld id="{A96754D5-AF5E-411A-9792-199172EBB005}" type="datetimeFigureOut">
               <a:rPr lang="de-DE" smtClean="0"/>
-              <a:t>11.07.2018</a:t>
+              <a:t>12.07.2018</a:t>
             </a:fld>
             <a:endParaRPr lang="de-DE"/>
           </a:p>
@@ -6912,7 +7005,7 @@
           <a:p>
             <a:fld id="{A96754D5-AF5E-411A-9792-199172EBB005}" type="datetimeFigureOut">
               <a:rPr lang="de-DE" smtClean="0"/>
-              <a:t>11.07.2018</a:t>
+              <a:t>12.07.2018</a:t>
             </a:fld>
             <a:endParaRPr lang="de-DE"/>
           </a:p>
@@ -7318,7 +7411,7 @@
           <a:p>
             <a:fld id="{A96754D5-AF5E-411A-9792-199172EBB005}" type="datetimeFigureOut">
               <a:rPr lang="de-DE" smtClean="0"/>
-              <a:t>11.07.2018</a:t>
+              <a:t>12.07.2018</a:t>
             </a:fld>
             <a:endParaRPr lang="de-DE"/>
           </a:p>

</xml_diff>